<commit_message>
Presentation & Document Updates
Updated formatting, references, and images.
</commit_message>
<xml_diff>
--- a/DOCUMENTATION/presentation/LTE_Cell_Search_presentation.pptx
+++ b/DOCUMENTATION/presentation/LTE_Cell_Search_presentation.pptx
@@ -7945,7 +7945,7 @@
                 <a14:useLocalDpi xmlns:a14="http://schemas.microsoft.com/office/drawing/2010/main" val="0"/>
               </a:ext>
               <a:ext uri="{96DAC541-7B7A-43D3-8B79-37D633B846F1}">
-                <asvg:svgBlip xmlns:asvg="http://schemas.microsoft.com/office/drawing/2016/SVG/main" xmlns="" r:embed="rId2"/>
+                <asvg:svgBlip xmlns="" xmlns:asvg="http://schemas.microsoft.com/office/drawing/2016/SVG/main" r:embed="rId2"/>
               </a:ext>
             </a:extLst>
           </a:blip>
@@ -8009,7 +8009,7 @@
                 <a14:useLocalDpi xmlns:a14="http://schemas.microsoft.com/office/drawing/2010/main" val="0"/>
               </a:ext>
               <a:ext uri="{96DAC541-7B7A-43D3-8B79-37D633B846F1}">
-                <asvg:svgBlip xmlns:asvg="http://schemas.microsoft.com/office/drawing/2016/SVG/main" xmlns="" r:embed="rId4"/>
+                <asvg:svgBlip xmlns="" xmlns:asvg="http://schemas.microsoft.com/office/drawing/2016/SVG/main" r:embed="rId4"/>
               </a:ext>
             </a:extLst>
           </a:blip>
@@ -8073,7 +8073,7 @@
                 <a14:useLocalDpi xmlns:a14="http://schemas.microsoft.com/office/drawing/2010/main" val="0"/>
               </a:ext>
               <a:ext uri="{96DAC541-7B7A-43D3-8B79-37D633B846F1}">
-                <asvg:svgBlip xmlns:asvg="http://schemas.microsoft.com/office/drawing/2016/SVG/main" xmlns="" r:embed="rId6"/>
+                <asvg:svgBlip xmlns="" xmlns:asvg="http://schemas.microsoft.com/office/drawing/2016/SVG/main" r:embed="rId6"/>
               </a:ext>
             </a:extLst>
           </a:blip>
@@ -8137,7 +8137,7 @@
                 <a14:useLocalDpi xmlns:a14="http://schemas.microsoft.com/office/drawing/2010/main" val="0"/>
               </a:ext>
               <a:ext uri="{96DAC541-7B7A-43D3-8B79-37D633B846F1}">
-                <asvg:svgBlip xmlns:asvg="http://schemas.microsoft.com/office/drawing/2016/SVG/main" xmlns="" r:embed="rId8"/>
+                <asvg:svgBlip xmlns="" xmlns:asvg="http://schemas.microsoft.com/office/drawing/2016/SVG/main" r:embed="rId8"/>
               </a:ext>
             </a:extLst>
           </a:blip>
@@ -8201,7 +8201,7 @@
                 <a14:useLocalDpi xmlns:a14="http://schemas.microsoft.com/office/drawing/2010/main" val="0"/>
               </a:ext>
               <a:ext uri="{96DAC541-7B7A-43D3-8B79-37D633B846F1}">
-                <asvg:svgBlip xmlns:asvg="http://schemas.microsoft.com/office/drawing/2016/SVG/main" xmlns="" r:embed="rId10"/>
+                <asvg:svgBlip xmlns="" xmlns:asvg="http://schemas.microsoft.com/office/drawing/2016/SVG/main" r:embed="rId10"/>
               </a:ext>
             </a:extLst>
           </a:blip>
@@ -9043,8 +9043,8 @@
     <dgm:cxn modelId="{A54C462F-0EA2-46DF-96D2-B65198FDA721}" srcId="{88BE51BF-FDE6-460E-BC11-57E25BCAE071}" destId="{B15B98D5-1077-46CC-A13F-96C972A86970}" srcOrd="0" destOrd="0" parTransId="{1A34E68B-18F8-46E8-A89E-7F44C032D830}" sibTransId="{6FC58989-C113-422C-9CBA-AF6AF4C008D3}"/>
     <dgm:cxn modelId="{2D91B5C3-652C-4522-8B0D-E0B23200942C}" type="presOf" srcId="{FC6DC963-8E94-4AC1-967B-08770B063D39}" destId="{A7D3A848-C6C9-406C-AB49-07500E70E37F}" srcOrd="0" destOrd="4" presId="urn:microsoft.com/office/officeart/2005/8/layout/vList4"/>
     <dgm:cxn modelId="{1274B70E-1A95-48B4-9F5C-736878DBA8B5}" type="presOf" srcId="{6762062A-A615-4FA1-860F-94E1C3877C30}" destId="{8A418F7B-28FF-4FEE-A0E0-AFEA1D42FFAC}" srcOrd="1" destOrd="1" presId="urn:microsoft.com/office/officeart/2005/8/layout/vList4"/>
+    <dgm:cxn modelId="{11008AD4-A093-46E5-AEA0-82F326547FEF}" srcId="{B15B98D5-1077-46CC-A13F-96C972A86970}" destId="{98ED5FCB-4D47-451F-BDFB-E89F136EE343}" srcOrd="0" destOrd="0" parTransId="{5D001409-6DE3-4020-918C-AD75C71BC3D7}" sibTransId="{74A057BB-CBC1-47EA-B06E-B81F25526EF6}"/>
     <dgm:cxn modelId="{A4F87B97-D707-4D02-A126-E3D32D793F44}" type="presOf" srcId="{6762062A-A615-4FA1-860F-94E1C3877C30}" destId="{662C4337-BB4E-4EA6-AF93-E326EE7D29D5}" srcOrd="0" destOrd="1" presId="urn:microsoft.com/office/officeart/2005/8/layout/vList4"/>
-    <dgm:cxn modelId="{11008AD4-A093-46E5-AEA0-82F326547FEF}" srcId="{B15B98D5-1077-46CC-A13F-96C972A86970}" destId="{98ED5FCB-4D47-451F-BDFB-E89F136EE343}" srcOrd="0" destOrd="0" parTransId="{5D001409-6DE3-4020-918C-AD75C71BC3D7}" sibTransId="{74A057BB-CBC1-47EA-B06E-B81F25526EF6}"/>
     <dgm:cxn modelId="{235C01BC-535E-47F6-B8A9-2916DF32150B}" srcId="{B15B98D5-1077-46CC-A13F-96C972A86970}" destId="{0342B747-F28E-4AF7-9A19-A978ED688663}" srcOrd="1" destOrd="0" parTransId="{596F6291-E788-4C1F-AA54-7E2CF27DF84E}" sibTransId="{0276571A-CC9B-4280-B9F2-7D765ED68953}"/>
     <dgm:cxn modelId="{4E2AE822-4019-43B0-8733-C30A3D4ACC22}" type="presOf" srcId="{98ED5FCB-4D47-451F-BDFB-E89F136EE343}" destId="{A7D3A848-C6C9-406C-AB49-07500E70E37F}" srcOrd="0" destOrd="1" presId="urn:microsoft.com/office/officeart/2005/8/layout/vList4"/>
     <dgm:cxn modelId="{354A290D-5E73-4CF4-8B08-D88E232197DC}" type="presOf" srcId="{19EA09E5-A32B-4C32-891F-4854478116A2}" destId="{A7D3A848-C6C9-406C-AB49-07500E70E37F}" srcOrd="0" destOrd="3" presId="urn:microsoft.com/office/officeart/2005/8/layout/vList4"/>
@@ -9056,13 +9056,13 @@
     <dgm:cxn modelId="{15CE0168-11B4-4C47-BE1E-F71B013599D1}" type="presOf" srcId="{53A75ADE-75C8-4404-90DA-3FA67EC9A571}" destId="{8A418F7B-28FF-4FEE-A0E0-AFEA1D42FFAC}" srcOrd="1" destOrd="0" presId="urn:microsoft.com/office/officeart/2005/8/layout/vList4"/>
     <dgm:cxn modelId="{1F032B5B-8696-47F8-9F98-32A2678AB89A}" type="presOf" srcId="{62203799-1E0D-4C37-B762-F9E335A69071}" destId="{8A418F7B-28FF-4FEE-A0E0-AFEA1D42FFAC}" srcOrd="1" destOrd="2" presId="urn:microsoft.com/office/officeart/2005/8/layout/vList4"/>
     <dgm:cxn modelId="{6CDB3C07-F251-4D6F-8753-31C0B56EB4BC}" type="presOf" srcId="{B15B98D5-1077-46CC-A13F-96C972A86970}" destId="{717CC320-C5D5-46F6-AFA6-CD2108AEA003}" srcOrd="1" destOrd="0" presId="urn:microsoft.com/office/officeart/2005/8/layout/vList4"/>
+    <dgm:cxn modelId="{A4B65C6C-5B54-4713-8282-59817BECAAB4}" srcId="{B15B98D5-1077-46CC-A13F-96C972A86970}" destId="{FC6DC963-8E94-4AC1-967B-08770B063D39}" srcOrd="3" destOrd="0" parTransId="{02EC6B2C-0E5D-49AF-99E9-92715BB46E96}" sibTransId="{BB20D0AB-9A6F-4191-AFD6-62ED5BA64971}"/>
     <dgm:cxn modelId="{D187F5BC-6DB6-4CA7-8EAE-F535C4CB0EAE}" type="presOf" srcId="{19EA09E5-A32B-4C32-891F-4854478116A2}" destId="{717CC320-C5D5-46F6-AFA6-CD2108AEA003}" srcOrd="1" destOrd="3" presId="urn:microsoft.com/office/officeart/2005/8/layout/vList4"/>
-    <dgm:cxn modelId="{A4B65C6C-5B54-4713-8282-59817BECAAB4}" srcId="{B15B98D5-1077-46CC-A13F-96C972A86970}" destId="{FC6DC963-8E94-4AC1-967B-08770B063D39}" srcOrd="3" destOrd="0" parTransId="{02EC6B2C-0E5D-49AF-99E9-92715BB46E96}" sibTransId="{BB20D0AB-9A6F-4191-AFD6-62ED5BA64971}"/>
     <dgm:cxn modelId="{28C35176-BD97-43EF-AA6E-36AC4EDFBC51}" type="presOf" srcId="{9ED39EA1-012D-46E7-B871-B5C4B3DBD0A1}" destId="{2501B7B2-9006-4E0D-B92F-86EE4F67BC09}" srcOrd="1" destOrd="2" presId="urn:microsoft.com/office/officeart/2005/8/layout/vList4"/>
     <dgm:cxn modelId="{16C45517-63C3-4E22-A017-C843E1F32F3C}" type="presOf" srcId="{98ED5FCB-4D47-451F-BDFB-E89F136EE343}" destId="{717CC320-C5D5-46F6-AFA6-CD2108AEA003}" srcOrd="1" destOrd="1" presId="urn:microsoft.com/office/officeart/2005/8/layout/vList4"/>
     <dgm:cxn modelId="{45A42484-6C8B-4065-9FCA-729FB39FB2D1}" srcId="{53A75ADE-75C8-4404-90DA-3FA67EC9A571}" destId="{62203799-1E0D-4C37-B762-F9E335A69071}" srcOrd="1" destOrd="0" parTransId="{31D60A87-68B2-4460-B4A9-95E4D56D3904}" sibTransId="{3361AE0B-418F-4E7E-864B-ABFCA7D67514}"/>
+    <dgm:cxn modelId="{B8EF0BBA-0AC8-4683-A3D0-CB973C0C0888}" srcId="{68713C72-0570-4166-975D-555514EBBA62}" destId="{9ED39EA1-012D-46E7-B871-B5C4B3DBD0A1}" srcOrd="1" destOrd="0" parTransId="{EAD6420F-EA69-452A-808B-AC6F73E100E7}" sibTransId="{045748AA-FA49-4DAB-8077-38424E111701}"/>
     <dgm:cxn modelId="{ED40C5DC-8F39-4F28-95A3-147DBFB4784A}" srcId="{68713C72-0570-4166-975D-555514EBBA62}" destId="{8C90C2B6-4176-4B5A-B1F4-E1C9CB63AB11}" srcOrd="0" destOrd="0" parTransId="{0F7CC9E8-4C38-44B2-9BD6-D783EF13368C}" sibTransId="{4D571C2E-0FD4-4C1C-A294-1CD7D80CEF34}"/>
-    <dgm:cxn modelId="{B8EF0BBA-0AC8-4683-A3D0-CB973C0C0888}" srcId="{68713C72-0570-4166-975D-555514EBBA62}" destId="{9ED39EA1-012D-46E7-B871-B5C4B3DBD0A1}" srcOrd="1" destOrd="0" parTransId="{EAD6420F-EA69-452A-808B-AC6F73E100E7}" sibTransId="{045748AA-FA49-4DAB-8077-38424E111701}"/>
     <dgm:cxn modelId="{04B15254-CCF7-4943-A59C-7D700B49A65C}" type="presOf" srcId="{0342B747-F28E-4AF7-9A19-A978ED688663}" destId="{A7D3A848-C6C9-406C-AB49-07500E70E37F}" srcOrd="0" destOrd="2" presId="urn:microsoft.com/office/officeart/2005/8/layout/vList4"/>
     <dgm:cxn modelId="{D54D3D88-AF42-49B3-A72C-69B1A64BF64F}" type="presOf" srcId="{0342B747-F28E-4AF7-9A19-A978ED688663}" destId="{717CC320-C5D5-46F6-AFA6-CD2108AEA003}" srcOrd="1" destOrd="2" presId="urn:microsoft.com/office/officeart/2005/8/layout/vList4"/>
     <dgm:cxn modelId="{2C053EEC-18FD-460C-8C72-F2AEE07AB5F9}" type="presOf" srcId="{8C90C2B6-4176-4B5A-B1F4-E1C9CB63AB11}" destId="{87B9AB88-0CCC-4E81-8457-E8A0BA4FCCE2}" srcOrd="0" destOrd="1" presId="urn:microsoft.com/office/officeart/2005/8/layout/vList4"/>
@@ -12804,9 +12804,9 @@
     <dgm:cxn modelId="{BC933C43-F22E-43A0-B5E6-FA4627D4DF2A}" srcId="{10E29B4B-8BFA-4056-B1B5-1DBB75F02FCD}" destId="{7215D033-5D38-48B9-86B5-C8CB14C2061E}" srcOrd="4" destOrd="0" parTransId="{0AF0024F-CB2B-4AE1-8C6E-9D8F629450B0}" sibTransId="{ED044E70-697B-42E4-9079-817B05613E73}"/>
     <dgm:cxn modelId="{4A9623FF-2C03-4934-AB58-DA6A16A7A35A}" srcId="{10E29B4B-8BFA-4056-B1B5-1DBB75F02FCD}" destId="{4BB4D8A7-009D-41DA-8632-D85B9510E43F}" srcOrd="0" destOrd="0" parTransId="{6B514510-1122-40ED-801E-6CE9D4972BCA}" sibTransId="{E6BB4C43-C469-4C06-86FB-E5D9E2FDF4B7}"/>
     <dgm:cxn modelId="{FBAB5C44-D332-43A5-A881-7B986ABC1699}" type="presOf" srcId="{EB42F4EB-6E4F-4F1E-81AC-2244216A4F8A}" destId="{0E73D1DA-0004-4AA2-9D04-1272AE79437D}" srcOrd="0" destOrd="2" presId="urn:microsoft.com/office/officeart/2005/8/layout/vList6"/>
+    <dgm:cxn modelId="{6C01D0B4-04CC-4F84-97FD-9D60B32DBE20}" type="presOf" srcId="{70FBF2AC-1DD2-4438-83E2-EB066D79E4AE}" destId="{0E73D1DA-0004-4AA2-9D04-1272AE79437D}" srcOrd="0" destOrd="0" presId="urn:microsoft.com/office/officeart/2005/8/layout/vList6"/>
+    <dgm:cxn modelId="{D7A142C6-5655-4528-BE05-194571447BC9}" srcId="{10E29B4B-8BFA-4056-B1B5-1DBB75F02FCD}" destId="{51FF1763-AFAC-40EF-85CA-D14917810DC8}" srcOrd="1" destOrd="0" parTransId="{020BD75D-295D-4D84-9E92-497A7E5164D2}" sibTransId="{8D03821B-B506-49E1-A36A-11AF833314DE}"/>
     <dgm:cxn modelId="{6B7311ED-83CB-4F3F-AAFC-34F82542B26F}" srcId="{1E41E7C5-AEBC-4789-9F35-29B3FCD4BC1F}" destId="{EB42F4EB-6E4F-4F1E-81AC-2244216A4F8A}" srcOrd="2" destOrd="0" parTransId="{372BD233-D2A8-4B34-8D1F-319A06D51E7C}" sibTransId="{D92DEEB7-3B5D-4139-B41D-BAE28CD9554E}"/>
-    <dgm:cxn modelId="{D7A142C6-5655-4528-BE05-194571447BC9}" srcId="{10E29B4B-8BFA-4056-B1B5-1DBB75F02FCD}" destId="{51FF1763-AFAC-40EF-85CA-D14917810DC8}" srcOrd="1" destOrd="0" parTransId="{020BD75D-295D-4D84-9E92-497A7E5164D2}" sibTransId="{8D03821B-B506-49E1-A36A-11AF833314DE}"/>
-    <dgm:cxn modelId="{6C01D0B4-04CC-4F84-97FD-9D60B32DBE20}" type="presOf" srcId="{70FBF2AC-1DD2-4438-83E2-EB066D79E4AE}" destId="{0E73D1DA-0004-4AA2-9D04-1272AE79437D}" srcOrd="0" destOrd="0" presId="urn:microsoft.com/office/officeart/2005/8/layout/vList6"/>
     <dgm:cxn modelId="{49321569-DE03-4300-B8EF-66FB10900CD8}" srcId="{10E29B4B-8BFA-4056-B1B5-1DBB75F02FCD}" destId="{B0607308-9FD7-4717-9939-99085FEA60CE}" srcOrd="2" destOrd="0" parTransId="{933BD1BB-7E6F-47EB-9063-CE731F950C13}" sibTransId="{0C39702D-7D6F-47A3-9C3C-E14EA8CA979E}"/>
     <dgm:cxn modelId="{6227FA78-AE6A-4310-A379-A8DEB5EA4B19}" type="presOf" srcId="{7215D033-5D38-48B9-86B5-C8CB14C2061E}" destId="{BFC8549B-7DC5-4C3A-88E0-7C7E645508A7}" srcOrd="0" destOrd="4" presId="urn:microsoft.com/office/officeart/2005/8/layout/vList6"/>
     <dgm:cxn modelId="{FBDC0E14-7C22-4E8A-A547-47A35241B48B}" type="presOf" srcId="{4BB4D8A7-009D-41DA-8632-D85B9510E43F}" destId="{BFC8549B-7DC5-4C3A-88E0-7C7E645508A7}" srcOrd="0" destOrd="0" presId="urn:microsoft.com/office/officeart/2005/8/layout/vList6"/>
@@ -13260,17 +13260,17 @@
     </dgm:pt>
   </dgm:ptLst>
   <dgm:cxnLst>
+    <dgm:cxn modelId="{9F28D35A-7F04-4549-A2B5-9A0B9332418D}" srcId="{D20DC48F-F81C-4E06-8AE0-2DFBE2B00691}" destId="{33A035B4-B4D1-41E9-950E-4E59D351F766}" srcOrd="1" destOrd="0" parTransId="{D88F7119-B6F7-4865-AFA0-A343A5EC119C}" sibTransId="{157B9E93-9BE1-47D6-B1BF-15591568789A}"/>
+    <dgm:cxn modelId="{9EB96098-E318-4960-A6AC-1138C43A57B5}" type="presOf" srcId="{33A035B4-B4D1-41E9-950E-4E59D351F766}" destId="{3C9F55E0-0594-4779-B12C-B14E94FD8495}" srcOrd="1" destOrd="0" presId="urn:microsoft.com/office/officeart/2005/8/layout/hProcess7"/>
+    <dgm:cxn modelId="{72C1678E-5E84-48C8-BBEF-28ED7E4A6CF7}" srcId="{33A035B4-B4D1-41E9-950E-4E59D351F766}" destId="{8E83BDD4-26BF-4C64-95ED-1B42C68D74C7}" srcOrd="0" destOrd="0" parTransId="{F7B86196-3B81-4843-967B-5720C7DC45C7}" sibTransId="{ECA6965C-FD18-469D-AAD6-0CA87DDC7C3C}"/>
+    <dgm:cxn modelId="{979A381E-AD3A-4793-BBBE-D446AB9B6CBC}" type="presOf" srcId="{33A035B4-B4D1-41E9-950E-4E59D351F766}" destId="{7AC40396-4461-40B7-938B-A2E58DFF12A1}" srcOrd="0" destOrd="0" presId="urn:microsoft.com/office/officeart/2005/8/layout/hProcess7"/>
+    <dgm:cxn modelId="{D61A11DD-DC94-4235-ACC2-BAA893BB444B}" type="presOf" srcId="{63B47B4D-071A-498F-8C9F-1A13C2B15C01}" destId="{CCB164D4-1EB7-4071-8206-CD40DDD7DB03}" srcOrd="1" destOrd="0" presId="urn:microsoft.com/office/officeart/2005/8/layout/hProcess7"/>
+    <dgm:cxn modelId="{13157DA1-9AB2-4790-BBA7-6585986259D6}" srcId="{63B47B4D-071A-498F-8C9F-1A13C2B15C01}" destId="{C166B291-098E-4911-BF9D-91A866267DC8}" srcOrd="0" destOrd="0" parTransId="{162B20DF-6C04-44AF-BC7C-F16C1BE1BF1C}" sibTransId="{6B99853F-F62E-43C2-8DB5-6310C36FF66D}"/>
+    <dgm:cxn modelId="{B1158A1F-93FB-45A8-AA0F-D640AAF11275}" type="presOf" srcId="{D20DC48F-F81C-4E06-8AE0-2DFBE2B00691}" destId="{E33EE2EC-D615-4311-9B2F-C0EFB6A029BB}" srcOrd="0" destOrd="0" presId="urn:microsoft.com/office/officeart/2005/8/layout/hProcess7"/>
     <dgm:cxn modelId="{3BDA5D2F-3C3B-459D-BF19-EFC18756592C}" type="presOf" srcId="{63B47B4D-071A-498F-8C9F-1A13C2B15C01}" destId="{5298D35E-26E6-411F-A779-6DF8009A0CAA}" srcOrd="0" destOrd="0" presId="urn:microsoft.com/office/officeart/2005/8/layout/hProcess7"/>
-    <dgm:cxn modelId="{72C1678E-5E84-48C8-BBEF-28ED7E4A6CF7}" srcId="{33A035B4-B4D1-41E9-950E-4E59D351F766}" destId="{8E83BDD4-26BF-4C64-95ED-1B42C68D74C7}" srcOrd="0" destOrd="0" parTransId="{F7B86196-3B81-4843-967B-5720C7DC45C7}" sibTransId="{ECA6965C-FD18-469D-AAD6-0CA87DDC7C3C}"/>
     <dgm:cxn modelId="{F27CD116-C6DB-402E-AC00-92DA15CD8E2E}" type="presOf" srcId="{8E83BDD4-26BF-4C64-95ED-1B42C68D74C7}" destId="{5E95B5E5-B1CB-4100-89EE-067CC2CA5EE9}" srcOrd="0" destOrd="0" presId="urn:microsoft.com/office/officeart/2005/8/layout/hProcess7"/>
-    <dgm:cxn modelId="{979A381E-AD3A-4793-BBBE-D446AB9B6CBC}" type="presOf" srcId="{33A035B4-B4D1-41E9-950E-4E59D351F766}" destId="{7AC40396-4461-40B7-938B-A2E58DFF12A1}" srcOrd="0" destOrd="0" presId="urn:microsoft.com/office/officeart/2005/8/layout/hProcess7"/>
-    <dgm:cxn modelId="{B1158A1F-93FB-45A8-AA0F-D640AAF11275}" type="presOf" srcId="{D20DC48F-F81C-4E06-8AE0-2DFBE2B00691}" destId="{E33EE2EC-D615-4311-9B2F-C0EFB6A029BB}" srcOrd="0" destOrd="0" presId="urn:microsoft.com/office/officeart/2005/8/layout/hProcess7"/>
-    <dgm:cxn modelId="{13157DA1-9AB2-4790-BBA7-6585986259D6}" srcId="{63B47B4D-071A-498F-8C9F-1A13C2B15C01}" destId="{C166B291-098E-4911-BF9D-91A866267DC8}" srcOrd="0" destOrd="0" parTransId="{162B20DF-6C04-44AF-BC7C-F16C1BE1BF1C}" sibTransId="{6B99853F-F62E-43C2-8DB5-6310C36FF66D}"/>
-    <dgm:cxn modelId="{9F28D35A-7F04-4549-A2B5-9A0B9332418D}" srcId="{D20DC48F-F81C-4E06-8AE0-2DFBE2B00691}" destId="{33A035B4-B4D1-41E9-950E-4E59D351F766}" srcOrd="1" destOrd="0" parTransId="{D88F7119-B6F7-4865-AFA0-A343A5EC119C}" sibTransId="{157B9E93-9BE1-47D6-B1BF-15591568789A}"/>
+    <dgm:cxn modelId="{04DDEE56-B926-40B5-AE60-91E10DD69203}" type="presOf" srcId="{C166B291-098E-4911-BF9D-91A866267DC8}" destId="{B0EEBAEF-B799-4CE1-9B07-126B5B7A4F11}" srcOrd="0" destOrd="0" presId="urn:microsoft.com/office/officeart/2005/8/layout/hProcess7"/>
     <dgm:cxn modelId="{0E812A85-2E8E-409D-8519-58ABB19DE121}" srcId="{D20DC48F-F81C-4E06-8AE0-2DFBE2B00691}" destId="{63B47B4D-071A-498F-8C9F-1A13C2B15C01}" srcOrd="0" destOrd="0" parTransId="{4DE0C001-7F15-40BE-AEE6-4F1C49C8DD0A}" sibTransId="{DF1A57EA-6953-4E3B-BDE3-C1C5CDAA7AD8}"/>
-    <dgm:cxn modelId="{04DDEE56-B926-40B5-AE60-91E10DD69203}" type="presOf" srcId="{C166B291-098E-4911-BF9D-91A866267DC8}" destId="{B0EEBAEF-B799-4CE1-9B07-126B5B7A4F11}" srcOrd="0" destOrd="0" presId="urn:microsoft.com/office/officeart/2005/8/layout/hProcess7"/>
-    <dgm:cxn modelId="{9EB96098-E318-4960-A6AC-1138C43A57B5}" type="presOf" srcId="{33A035B4-B4D1-41E9-950E-4E59D351F766}" destId="{3C9F55E0-0594-4779-B12C-B14E94FD8495}" srcOrd="1" destOrd="0" presId="urn:microsoft.com/office/officeart/2005/8/layout/hProcess7"/>
-    <dgm:cxn modelId="{D61A11DD-DC94-4235-ACC2-BAA893BB444B}" type="presOf" srcId="{63B47B4D-071A-498F-8C9F-1A13C2B15C01}" destId="{CCB164D4-1EB7-4071-8206-CD40DDD7DB03}" srcOrd="1" destOrd="0" presId="urn:microsoft.com/office/officeart/2005/8/layout/hProcess7"/>
     <dgm:cxn modelId="{D3FA5F58-11D0-4324-8B5D-9CB35A1D12BD}" type="presParOf" srcId="{E33EE2EC-D615-4311-9B2F-C0EFB6A029BB}" destId="{C2FDB374-0B6A-490A-ADDA-118860A0C77A}" srcOrd="0" destOrd="0" presId="urn:microsoft.com/office/officeart/2005/8/layout/hProcess7"/>
     <dgm:cxn modelId="{4D2C7E52-D039-403F-87C5-A98F0A8BA9AE}" type="presParOf" srcId="{C2FDB374-0B6A-490A-ADDA-118860A0C77A}" destId="{5298D35E-26E6-411F-A779-6DF8009A0CAA}" srcOrd="0" destOrd="0" presId="urn:microsoft.com/office/officeart/2005/8/layout/hProcess7"/>
     <dgm:cxn modelId="{DAD0822C-B074-4930-A503-B8E900AE913D}" type="presParOf" srcId="{C2FDB374-0B6A-490A-ADDA-118860A0C77A}" destId="{CCB164D4-1EB7-4071-8206-CD40DDD7DB03}" srcOrd="1" destOrd="0" presId="urn:microsoft.com/office/officeart/2005/8/layout/hProcess7"/>
@@ -13789,7 +13789,7 @@
                 <a14:useLocalDpi xmlns:a14="http://schemas.microsoft.com/office/drawing/2010/main" val="0"/>
               </a:ext>
               <a:ext uri="{96DAC541-7B7A-43D3-8B79-37D633B846F1}">
-                <asvg:svgBlip xmlns:asvg="http://schemas.microsoft.com/office/drawing/2016/SVG/main" xmlns="" r:embed="rId2"/>
+                <asvg:svgBlip xmlns="" xmlns:asvg="http://schemas.microsoft.com/office/drawing/2016/SVG/main" r:embed="rId2"/>
               </a:ext>
             </a:extLst>
           </a:blip>
@@ -13970,7 +13970,7 @@
                 <a14:useLocalDpi xmlns:a14="http://schemas.microsoft.com/office/drawing/2010/main" val="0"/>
               </a:ext>
               <a:ext uri="{96DAC541-7B7A-43D3-8B79-37D633B846F1}">
-                <asvg:svgBlip xmlns:asvg="http://schemas.microsoft.com/office/drawing/2016/SVG/main" xmlns="" r:embed="rId4"/>
+                <asvg:svgBlip xmlns="" xmlns:asvg="http://schemas.microsoft.com/office/drawing/2016/SVG/main" r:embed="rId4"/>
               </a:ext>
             </a:extLst>
           </a:blip>
@@ -14150,7 +14150,7 @@
                 <a14:useLocalDpi xmlns:a14="http://schemas.microsoft.com/office/drawing/2010/main" val="0"/>
               </a:ext>
               <a:ext uri="{96DAC541-7B7A-43D3-8B79-37D633B846F1}">
-                <asvg:svgBlip xmlns:asvg="http://schemas.microsoft.com/office/drawing/2016/SVG/main" xmlns="" r:embed="rId6"/>
+                <asvg:svgBlip xmlns="" xmlns:asvg="http://schemas.microsoft.com/office/drawing/2016/SVG/main" r:embed="rId6"/>
               </a:ext>
             </a:extLst>
           </a:blip>
@@ -14334,7 +14334,7 @@
                 <a14:useLocalDpi xmlns:a14="http://schemas.microsoft.com/office/drawing/2010/main" val="0"/>
               </a:ext>
               <a:ext uri="{96DAC541-7B7A-43D3-8B79-37D633B846F1}">
-                <asvg:svgBlip xmlns:asvg="http://schemas.microsoft.com/office/drawing/2016/SVG/main" xmlns="" r:embed="rId8"/>
+                <asvg:svgBlip xmlns="" xmlns:asvg="http://schemas.microsoft.com/office/drawing/2016/SVG/main" r:embed="rId8"/>
               </a:ext>
             </a:extLst>
           </a:blip>
@@ -14557,7 +14557,7 @@
                 <a14:useLocalDpi xmlns:a14="http://schemas.microsoft.com/office/drawing/2010/main" val="0"/>
               </a:ext>
               <a:ext uri="{96DAC541-7B7A-43D3-8B79-37D633B846F1}">
-                <asvg:svgBlip xmlns:asvg="http://schemas.microsoft.com/office/drawing/2016/SVG/main" xmlns="" r:embed="rId10"/>
+                <asvg:svgBlip xmlns="" xmlns:asvg="http://schemas.microsoft.com/office/drawing/2016/SVG/main" r:embed="rId10"/>
               </a:ext>
             </a:extLst>
           </a:blip>
@@ -20206,7 +20206,7 @@
   </dgm:layoutNode>
   <dgm:extLst>
     <a:ext uri="{68A01E43-0DF5-4B5B-8FA6-DAF915123BFB}">
-      <dgm1612:lstStyle xmlns:dgm1612="http://schemas.microsoft.com/office/drawing/2016/12/diagram" xmlns="">
+      <dgm1612:lstStyle xmlns="" xmlns:dgm1612="http://schemas.microsoft.com/office/drawing/2016/12/diagram">
         <a:lvl1pPr>
           <a:lnSpc>
             <a:spcPct val="100000"/>
@@ -38616,7 +38616,7 @@
                 </a:solidFill>
                 <a:latin typeface="Calibri"/>
               </a:rPr>
-              <a:t>6/8/2022</a:t>
+              <a:t>6/9/2022</a:t>
             </a:fld>
             <a:endParaRPr lang="en-US" sz="1200" b="0" strike="noStrike" spc="-1">
               <a:latin typeface="Times New Roman"/>
@@ -39161,7 +39161,7 @@
                 </a:solidFill>
                 <a:latin typeface="Calibri"/>
               </a:rPr>
-              <a:t>6/8/2022</a:t>
+              <a:t>6/9/2022</a:t>
             </a:fld>
             <a:endParaRPr lang="en-US" sz="1200" b="0" strike="noStrike" spc="-1">
               <a:latin typeface="Times New Roman"/>
@@ -39596,7 +39596,7 @@
     <mc:Choice Requires="p14">
       <p:transition spd="slow" p14:dur="2000" advTm="7000"/>
     </mc:Choice>
-    <mc:Fallback xmlns:p15="http://schemas.microsoft.com/office/powerpoint/2012/main" xmlns="">
+    <mc:Fallback xmlns="" xmlns:p15="http://schemas.microsoft.com/office/powerpoint/2012/main">
       <p:transition spd="slow" advTm="7000"/>
     </mc:Fallback>
   </mc:AlternateContent>
@@ -39833,7 +39833,7 @@
     <mc:Choice Requires="p14">
       <p:transition spd="slow" p14:dur="2000" advTm="14000"/>
     </mc:Choice>
-    <mc:Fallback xmlns:p15="http://schemas.microsoft.com/office/powerpoint/2012/main" xmlns="">
+    <mc:Fallback xmlns="" xmlns:p15="http://schemas.microsoft.com/office/powerpoint/2012/main">
       <p:transition spd="slow" advTm="14000"/>
     </mc:Fallback>
   </mc:AlternateContent>
@@ -39985,7 +39985,7 @@
     <mc:Choice Requires="p14">
       <p:transition spd="slow" p14:dur="2000" advTm="24000"/>
     </mc:Choice>
-    <mc:Fallback xmlns:p15="http://schemas.microsoft.com/office/powerpoint/2012/main" xmlns="">
+    <mc:Fallback xmlns="" xmlns:p15="http://schemas.microsoft.com/office/powerpoint/2012/main">
       <p:transition spd="slow" advTm="24000"/>
     </mc:Fallback>
   </mc:AlternateContent>
@@ -40029,8 +40029,8 @@
         </p:blipFill>
         <p:spPr>
           <a:xfrm>
-            <a:off x="6095880" y="1713120"/>
-            <a:ext cx="5459040" cy="4078080"/>
+            <a:off x="6095880" y="1143000"/>
+            <a:ext cx="4343520" cy="3087480"/>
           </a:xfrm>
           <a:prstGeom prst="rect">
             <a:avLst/>
@@ -40048,8 +40048,8 @@
         </p:nvSpPr>
         <p:spPr>
           <a:xfrm>
-            <a:off x="4267200" y="5375355"/>
-            <a:ext cx="7924800" cy="1482285"/>
+            <a:off x="4267200" y="3886200"/>
+            <a:ext cx="7924800" cy="2971441"/>
           </a:xfrm>
           <a:prstGeom prst="rect">
             <a:avLst/>
@@ -40125,7 +40125,7 @@
         <p:spPr>
           <a:xfrm>
             <a:off x="6095880" y="457440"/>
-            <a:ext cx="5459040" cy="1218960"/>
+            <a:ext cx="4572120" cy="990360"/>
           </a:xfrm>
           <a:prstGeom prst="rect">
             <a:avLst/>
@@ -40274,8 +40274,8 @@
         </p:nvSpPr>
         <p:spPr>
           <a:xfrm>
-            <a:off x="4343400" y="5288340"/>
-            <a:ext cx="7848600" cy="1569660"/>
+            <a:off x="4343400" y="3971536"/>
+            <a:ext cx="7848600" cy="3046988"/>
           </a:xfrm>
           <a:prstGeom prst="rect">
             <a:avLst/>
@@ -40289,70 +40289,291 @@
           <a:p>
             <a:pPr fontAlgn="base"/>
             <a:r>
-              <a:rPr lang="en-US" sz="1600" dirty="0" smtClean="0"/>
+              <a:rPr lang="en-US" sz="1600" dirty="0" smtClean="0">
+                <a:solidFill>
+                  <a:schemeClr val="bg1"/>
+                </a:solidFill>
+              </a:rPr>
               <a:t>References</a:t>
             </a:r>
           </a:p>
           <a:p>
-            <a:pPr marL="342900" indent="-342900" fontAlgn="base">
-              <a:buFont typeface="+mj-lt"/>
-              <a:buAutoNum type="arabicPeriod"/>
-            </a:pPr>
+            <a:pPr fontAlgn="base"/>
             <a:r>
-              <a:rPr lang="en-US" sz="1600" u="sng" dirty="0" smtClean="0"/>
-              <a:t>https</a:t>
+              <a:rPr lang="en-US" sz="1600" dirty="0">
+                <a:solidFill>
+                  <a:schemeClr val="bg1"/>
+                </a:solidFill>
+              </a:rPr>
+              <a:t>[1</a:t>
             </a:r>
             <a:r>
-              <a:rPr lang="en-US" sz="1600" u="sng" dirty="0"/>
-              <a:t>://www.mathworks.com/help/wireless-hdl/ug/lte-hdl-cell-search.html</a:t>
+              <a:rPr lang="en-US" sz="1600" dirty="0" smtClean="0">
+                <a:solidFill>
+                  <a:schemeClr val="bg1"/>
+                </a:solidFill>
+              </a:rPr>
+              <a:t>] https</a:t>
             </a:r>
             <a:r>
-              <a:rPr lang="en-US" sz="1600" dirty="0"/>
-              <a:t> </a:t>
+              <a:rPr lang="en-US" sz="1600" dirty="0">
+                <a:solidFill>
+                  <a:schemeClr val="bg1"/>
+                </a:solidFill>
+              </a:rPr>
+              <a:t>://www.rfsoc-pynq.io/overlays.html</a:t>
             </a:r>
           </a:p>
           <a:p>
-            <a:pPr marL="342900" indent="-342900" fontAlgn="base">
-              <a:buFont typeface="+mj-lt"/>
-              <a:buAutoNum type="arabicPeriod"/>
-            </a:pPr>
+            <a:pPr fontAlgn="base"/>
             <a:r>
-              <a:rPr lang="en-US" sz="1600" u="sng" dirty="0"/>
-              <a:t>https://www.mathworks.com/help/lte/ug/synchronization-signals-pss-and-sss.html</a:t>
+              <a:rPr lang="en-US" sz="1600" dirty="0">
+                <a:solidFill>
+                  <a:schemeClr val="bg1"/>
+                </a:solidFill>
+              </a:rPr>
+              <a:t>[2</a:t>
             </a:r>
-            <a:endParaRPr lang="en-US" sz="1600" dirty="0"/>
-          </a:p>
-          <a:p>
-            <a:pPr marL="342900" indent="-342900" fontAlgn="base">
-              <a:buFont typeface="+mj-lt"/>
-              <a:buAutoNum type="arabicPeriod"/>
-            </a:pPr>
             <a:r>
-              <a:rPr lang="en-US" sz="1600" dirty="0"/>
-              <a:t>ML Estimation of Time and Frequency Offset in OFDM Systems (IEEE paper)</a:t>
+              <a:rPr lang="en-US" sz="1600" dirty="0" smtClean="0">
+                <a:solidFill>
+                  <a:schemeClr val="bg1"/>
+                </a:solidFill>
+              </a:rPr>
+              <a:t>] https</a:t>
+            </a:r>
+            <a:r>
+              <a:rPr lang="en-US" sz="1600" dirty="0">
+                <a:solidFill>
+                  <a:schemeClr val="bg1"/>
+                </a:solidFill>
+              </a:rPr>
+              <a:t>://www.rfsoc-pynq.io/base_overlay.html</a:t>
             </a:r>
           </a:p>
           <a:p>
-            <a:pPr marL="342900" indent="-342900" fontAlgn="base">
-              <a:buFont typeface="+mj-lt"/>
-              <a:buAutoNum type="arabicPeriod"/>
-            </a:pPr>
+            <a:pPr fontAlgn="base"/>
             <a:r>
-              <a:rPr lang="en-US" sz="1600" u="sng" dirty="0"/>
-              <a:t>https://www.mathworks.com/help/lte/ug/cell-search-mib-and-sib1-recovery.html</a:t>
+              <a:rPr lang="en-US" sz="1600" dirty="0">
+                <a:solidFill>
+                  <a:schemeClr val="bg1"/>
+                </a:solidFill>
+              </a:rPr>
+              <a:t>[3</a:t>
             </a:r>
-            <a:endParaRPr lang="en-US" sz="1600" dirty="0"/>
+            <a:r>
+              <a:rPr lang="en-US" sz="1600" dirty="0" smtClean="0">
+                <a:solidFill>
+                  <a:schemeClr val="bg1"/>
+                </a:solidFill>
+              </a:rPr>
+              <a:t>] https</a:t>
+            </a:r>
+            <a:r>
+              <a:rPr lang="en-US" sz="1600" dirty="0">
+                <a:solidFill>
+                  <a:schemeClr val="bg1"/>
+                </a:solidFill>
+              </a:rPr>
+              <a:t>://github.com/Xilinx/RFSoC2x2-PYNQ.git</a:t>
+            </a:r>
           </a:p>
           <a:p>
-            <a:pPr marL="342900" indent="-342900" fontAlgn="base">
-              <a:buFont typeface="+mj-lt"/>
-              <a:buAutoNum type="arabicPeriod"/>
-            </a:pPr>
+            <a:pPr fontAlgn="base"/>
             <a:r>
-              <a:rPr lang="en-US" sz="1600" u="sng" dirty="0"/>
-              <a:t>https://www.sharetechnote.com/html/FrameStructure_DL.html#Overview</a:t>
+              <a:rPr lang="en-US" sz="1600" dirty="0">
+                <a:solidFill>
+                  <a:schemeClr val="bg1"/>
+                </a:solidFill>
+              </a:rPr>
+              <a:t>[4</a:t>
             </a:r>
-            <a:endParaRPr lang="en-US" sz="1600" dirty="0"/>
+            <a:r>
+              <a:rPr lang="en-US" sz="1600" dirty="0" smtClean="0">
+                <a:solidFill>
+                  <a:schemeClr val="bg1"/>
+                </a:solidFill>
+              </a:rPr>
+              <a:t>] https</a:t>
+            </a:r>
+            <a:r>
+              <a:rPr lang="en-US" sz="1600" dirty="0">
+                <a:solidFill>
+                  <a:schemeClr val="bg1"/>
+                </a:solidFill>
+              </a:rPr>
+              <a:t>://github.com/strath-sdr/rfsoc_sam</a:t>
+            </a:r>
+          </a:p>
+          <a:p>
+            <a:pPr fontAlgn="base"/>
+            <a:r>
+              <a:rPr lang="en-US" sz="1600" dirty="0">
+                <a:solidFill>
+                  <a:schemeClr val="bg1"/>
+                </a:solidFill>
+              </a:rPr>
+              <a:t>[5</a:t>
+            </a:r>
+            <a:r>
+              <a:rPr lang="en-US" sz="1600" dirty="0" smtClean="0">
+                <a:solidFill>
+                  <a:schemeClr val="bg1"/>
+                </a:solidFill>
+              </a:rPr>
+              <a:t>] https</a:t>
+            </a:r>
+            <a:r>
+              <a:rPr lang="en-US" sz="1600" dirty="0">
+                <a:solidFill>
+                  <a:schemeClr val="bg1"/>
+                </a:solidFill>
+              </a:rPr>
+              <a:t>://github.com/strath-sdr/rfsoc_ofdm</a:t>
+            </a:r>
+          </a:p>
+          <a:p>
+            <a:pPr fontAlgn="base"/>
+            <a:r>
+              <a:rPr lang="en-US" sz="1600" dirty="0">
+                <a:solidFill>
+                  <a:schemeClr val="bg1"/>
+                </a:solidFill>
+              </a:rPr>
+              <a:t>[6</a:t>
+            </a:r>
+            <a:r>
+              <a:rPr lang="en-US" sz="1600" dirty="0" smtClean="0">
+                <a:solidFill>
+                  <a:schemeClr val="bg1"/>
+                </a:solidFill>
+              </a:rPr>
+              <a:t>] https</a:t>
+            </a:r>
+            <a:r>
+              <a:rPr lang="en-US" sz="1600" dirty="0">
+                <a:solidFill>
+                  <a:schemeClr val="bg1"/>
+                </a:solidFill>
+              </a:rPr>
+              <a:t>://www.mathworks.com/help/wireless-hdl/ug/lte-hdl-cell-search.html</a:t>
+            </a:r>
+          </a:p>
+          <a:p>
+            <a:pPr fontAlgn="base"/>
+            <a:r>
+              <a:rPr lang="en-US" sz="1600" dirty="0">
+                <a:solidFill>
+                  <a:schemeClr val="bg1"/>
+                </a:solidFill>
+              </a:rPr>
+              <a:t>[7</a:t>
+            </a:r>
+            <a:r>
+              <a:rPr lang="en-US" sz="1600" dirty="0" smtClean="0">
+                <a:solidFill>
+                  <a:schemeClr val="bg1"/>
+                </a:solidFill>
+              </a:rPr>
+              <a:t>] https</a:t>
+            </a:r>
+            <a:r>
+              <a:rPr lang="en-US" sz="1600" dirty="0">
+                <a:solidFill>
+                  <a:schemeClr val="bg1"/>
+                </a:solidFill>
+              </a:rPr>
+              <a:t>://www.mathworks.com/help/lte/ug/synchronization-signals-pss-and-sss.html</a:t>
+            </a:r>
+          </a:p>
+          <a:p>
+            <a:pPr fontAlgn="base"/>
+            <a:r>
+              <a:rPr lang="en-US" sz="1600" dirty="0">
+                <a:solidFill>
+                  <a:schemeClr val="bg1"/>
+                </a:solidFill>
+              </a:rPr>
+              <a:t>[8</a:t>
+            </a:r>
+            <a:r>
+              <a:rPr lang="en-US" sz="1600" dirty="0" smtClean="0">
+                <a:solidFill>
+                  <a:schemeClr val="bg1"/>
+                </a:solidFill>
+              </a:rPr>
+              <a:t>] https</a:t>
+            </a:r>
+            <a:r>
+              <a:rPr lang="en-US" sz="1600" dirty="0">
+                <a:solidFill>
+                  <a:schemeClr val="bg1"/>
+                </a:solidFill>
+              </a:rPr>
+              <a:t>://ieeexplore.ieee.org/document/599949</a:t>
+            </a:r>
+          </a:p>
+          <a:p>
+            <a:pPr fontAlgn="base"/>
+            <a:r>
+              <a:rPr lang="en-US" sz="1600" dirty="0">
+                <a:solidFill>
+                  <a:schemeClr val="bg1"/>
+                </a:solidFill>
+              </a:rPr>
+              <a:t>[9</a:t>
+            </a:r>
+            <a:r>
+              <a:rPr lang="en-US" sz="1600" dirty="0" smtClean="0">
+                <a:solidFill>
+                  <a:schemeClr val="bg1"/>
+                </a:solidFill>
+              </a:rPr>
+              <a:t>] https</a:t>
+            </a:r>
+            <a:r>
+              <a:rPr lang="en-US" sz="1600" dirty="0">
+                <a:solidFill>
+                  <a:schemeClr val="bg1"/>
+                </a:solidFill>
+              </a:rPr>
+              <a:t>://www.mathworks.com/help/lte/ug/cell-search-mib-and-sib1-recovery.html</a:t>
+            </a:r>
+          </a:p>
+          <a:p>
+            <a:pPr fontAlgn="base"/>
+            <a:r>
+              <a:rPr lang="en-US" sz="1600" dirty="0">
+                <a:solidFill>
+                  <a:schemeClr val="bg1"/>
+                </a:solidFill>
+              </a:rPr>
+              <a:t>[10</a:t>
+            </a:r>
+            <a:r>
+              <a:rPr lang="en-US" sz="1600" dirty="0" smtClean="0">
+                <a:solidFill>
+                  <a:schemeClr val="bg1"/>
+                </a:solidFill>
+              </a:rPr>
+              <a:t>] https</a:t>
+            </a:r>
+            <a:r>
+              <a:rPr lang="en-US" sz="1600" dirty="0">
+                <a:solidFill>
+                  <a:schemeClr val="bg1"/>
+                </a:solidFill>
+              </a:rPr>
+              <a:t>://www.sharetechnote.com/html/FrameStructure_DL.html#Overview</a:t>
+            </a:r>
+          </a:p>
+          <a:p>
+            <a:pPr fontAlgn="base"/>
+            <a:endParaRPr lang="en-US" sz="1600" dirty="0" smtClean="0">
+              <a:solidFill>
+                <a:schemeClr val="bg1"/>
+              </a:solidFill>
+            </a:endParaRPr>
           </a:p>
         </p:txBody>
       </p:sp>
@@ -40365,7 +40586,7 @@
     <mc:Choice Requires="p14">
       <p:transition spd="slow" p14:dur="2000"/>
     </mc:Choice>
-    <mc:Fallback xmlns:p15="http://schemas.microsoft.com/office/powerpoint/2012/main" xmlns="">
+    <mc:Fallback xmlns="" xmlns:p15="http://schemas.microsoft.com/office/powerpoint/2012/main">
       <p:transition spd="slow"/>
     </mc:Fallback>
   </mc:AlternateContent>
@@ -40608,7 +40829,7 @@
     <mc:Choice Requires="p14">
       <p:transition spd="slow" p14:dur="2000" advTm="41000"/>
     </mc:Choice>
-    <mc:Fallback xmlns:p15="http://schemas.microsoft.com/office/powerpoint/2012/main" xmlns="">
+    <mc:Fallback xmlns="" xmlns:p15="http://schemas.microsoft.com/office/powerpoint/2012/main">
       <p:transition spd="slow" advTm="41000"/>
     </mc:Fallback>
   </mc:AlternateContent>
@@ -40829,7 +41050,7 @@
     <mc:Choice Requires="p14">
       <p:transition spd="slow" p14:dur="2000" advTm="58000"/>
     </mc:Choice>
-    <mc:Fallback xmlns:p15="http://schemas.microsoft.com/office/powerpoint/2012/main" xmlns="">
+    <mc:Fallback xmlns="" xmlns:p15="http://schemas.microsoft.com/office/powerpoint/2012/main">
       <p:transition spd="slow" advTm="58000"/>
     </mc:Fallback>
   </mc:AlternateContent>
@@ -42305,7 +42526,7 @@
     <mc:Choice Requires="p14">
       <p:transition spd="slow" p14:dur="2000" advTm="31000"/>
     </mc:Choice>
-    <mc:Fallback xmlns:p15="http://schemas.microsoft.com/office/powerpoint/2012/main" xmlns="">
+    <mc:Fallback xmlns="" xmlns:p15="http://schemas.microsoft.com/office/powerpoint/2012/main">
       <p:transition spd="slow" advTm="31000"/>
     </mc:Fallback>
   </mc:AlternateContent>
@@ -42350,7 +42571,7 @@
         </p:spPr>
         <p:txBody>
           <a:bodyPr anchor="ctr">
-            <a:normAutofit fontScale="62500" lnSpcReduction="10000"/>
+            <a:normAutofit fontScale="62500" lnSpcReduction="20000"/>
           </a:bodyPr>
           <a:lstStyle/>
           <a:p>
@@ -42409,7 +42630,7 @@
     <mc:Choice Requires="p14">
       <p:transition spd="slow" p14:dur="2000" advTm="41000"/>
     </mc:Choice>
-    <mc:Fallback xmlns:p15="http://schemas.microsoft.com/office/powerpoint/2012/main" xmlns="">
+    <mc:Fallback xmlns="" xmlns:p15="http://schemas.microsoft.com/office/powerpoint/2012/main">
       <p:transition spd="slow" advTm="41000"/>
     </mc:Fallback>
   </mc:AlternateContent>
@@ -42606,7 +42827,7 @@
         </p:style>
         <p:txBody>
           <a:bodyPr anchor="ctr">
-            <a:normAutofit fontScale="47500" lnSpcReduction="10000"/>
+            <a:normAutofit fontScale="40000" lnSpcReduction="20000"/>
           </a:bodyPr>
           <a:lstStyle/>
           <a:p>
@@ -42833,7 +43054,7 @@
     <mc:Choice Requires="p14">
       <p:transition spd="slow" p14:dur="2000" advTm="20000"/>
     </mc:Choice>
-    <mc:Fallback xmlns:p15="http://schemas.microsoft.com/office/powerpoint/2012/main" xmlns="">
+    <mc:Fallback xmlns="" xmlns:p15="http://schemas.microsoft.com/office/powerpoint/2012/main">
       <p:transition spd="slow" advTm="20000"/>
     </mc:Fallback>
   </mc:AlternateContent>
@@ -43233,7 +43454,7 @@
     <mc:Choice Requires="p14">
       <p:transition spd="slow" p14:dur="2000" advTm="21000"/>
     </mc:Choice>
-    <mc:Fallback xmlns:p15="http://schemas.microsoft.com/office/powerpoint/2012/main" xmlns="">
+    <mc:Fallback xmlns="" xmlns:p15="http://schemas.microsoft.com/office/powerpoint/2012/main">
       <p:transition spd="slow" advTm="21000"/>
     </mc:Fallback>
   </mc:AlternateContent>
@@ -43513,7 +43734,7 @@
     <mc:Choice Requires="p14">
       <p:transition spd="slow" p14:dur="2000" advTm="11000"/>
     </mc:Choice>
-    <mc:Fallback xmlns:p15="http://schemas.microsoft.com/office/powerpoint/2012/main" xmlns="">
+    <mc:Fallback xmlns="" xmlns:p15="http://schemas.microsoft.com/office/powerpoint/2012/main">
       <p:transition spd="slow" advTm="11000"/>
     </mc:Fallback>
   </mc:AlternateContent>
@@ -43695,7 +43916,7 @@
     <mc:Choice Requires="p14">
       <p:transition spd="slow" p14:dur="2000" advTm="15000"/>
     </mc:Choice>
-    <mc:Fallback xmlns:p15="http://schemas.microsoft.com/office/powerpoint/2012/main" xmlns="">
+    <mc:Fallback xmlns="" xmlns:p15="http://schemas.microsoft.com/office/powerpoint/2012/main">
       <p:transition spd="slow" advTm="15000"/>
     </mc:Fallback>
   </mc:AlternateContent>

</xml_diff>